<commit_message>
fixed up notebook and ppt for today
</commit_message>
<xml_diff>
--- a/Wi21_content/SEDS/L6.NothingToSomething.pptx
+++ b/Wi21_content/SEDS/L6.NothingToSomething.pptx
@@ -5,12 +5,14 @@
     <p:sldMasterId id="2147483648" r:id="rId1"/>
   </p:sldMasterIdLst>
   <p:notesMasterIdLst>
-    <p:notesMasterId r:id="rId5"/>
+    <p:notesMasterId r:id="rId7"/>
   </p:notesMasterIdLst>
   <p:sldIdLst>
     <p:sldId id="256" r:id="rId2"/>
     <p:sldId id="295" r:id="rId3"/>
-    <p:sldId id="296" r:id="rId4"/>
+    <p:sldId id="297" r:id="rId4"/>
+    <p:sldId id="298" r:id="rId5"/>
+    <p:sldId id="296" r:id="rId6"/>
   </p:sldIdLst>
   <p:sldSz cx="9144000" cy="6858000" type="screen4x3"/>
   <p:notesSz cx="6858000" cy="9144000"/>
@@ -130,18 +132,10 @@
 
 <file path=ppt/commentAuthors.xml><?xml version="1.0" encoding="utf-8"?>
 <p:cmAuthorLst xmlns:a="http://schemas.openxmlformats.org/drawingml/2006/main" xmlns:r="http://schemas.openxmlformats.org/officeDocument/2006/relationships" xmlns:p="http://schemas.openxmlformats.org/presentationml/2006/main">
-  <p:cmAuthor id="1" name="David A. Beck" initials="DAB" lastIdx="1" clrIdx="0">
-    <p:extLst/>
-  </p:cmAuthor>
-  <p:cmAuthor id="2" name="David A. Beck" initials="DAB [2]" lastIdx="1" clrIdx="1">
-    <p:extLst/>
-  </p:cmAuthor>
-  <p:cmAuthor id="3" name="David A. Beck" initials="DAB [2] [2]" lastIdx="1" clrIdx="2">
-    <p:extLst/>
-  </p:cmAuthor>
-  <p:cmAuthor id="4" name="David A. Beck" initials="DAB [3]" lastIdx="1" clrIdx="3">
-    <p:extLst/>
-  </p:cmAuthor>
+  <p:cmAuthor id="1" name="David A. Beck" initials="DAB" lastIdx="1" clrIdx="0"/>
+  <p:cmAuthor id="2" name="David A. Beck" initials="DAB [2]" lastIdx="1" clrIdx="1"/>
+  <p:cmAuthor id="3" name="David A. Beck" initials="DAB [2] [2]" lastIdx="1" clrIdx="2"/>
+  <p:cmAuthor id="4" name="David A. Beck" initials="DAB [3]" lastIdx="1" clrIdx="3"/>
 </p:cmAuthorLst>
 </file>
 
@@ -227,7 +221,7 @@
           <a:p>
             <a:fld id="{08F62E20-B1AA-3442-B8F1-F4A56998389D}" type="datetimeFigureOut">
               <a:rPr lang="en-US" smtClean="0"/>
-              <a:t>2/3/20</a:t>
+              <a:t>1/25/2022</a:t>
             </a:fld>
             <a:endParaRPr lang="en-US"/>
           </a:p>
@@ -765,7 +759,7 @@
           <a:p>
             <a:fld id="{2691D6E4-0F7A-0249-86EF-226720E50E4C}" type="datetimeFigureOut">
               <a:rPr lang="en-US" smtClean="0"/>
-              <a:t>2/3/20</a:t>
+              <a:t>1/25/2022</a:t>
             </a:fld>
             <a:endParaRPr lang="en-US"/>
           </a:p>
@@ -957,7 +951,7 @@
           <a:p>
             <a:fld id="{2691D6E4-0F7A-0249-86EF-226720E50E4C}" type="datetimeFigureOut">
               <a:rPr lang="en-US" smtClean="0"/>
-              <a:t>2/3/20</a:t>
+              <a:t>1/25/2022</a:t>
             </a:fld>
             <a:endParaRPr lang="en-US"/>
           </a:p>
@@ -1159,7 +1153,7 @@
           <a:p>
             <a:fld id="{2691D6E4-0F7A-0249-86EF-226720E50E4C}" type="datetimeFigureOut">
               <a:rPr lang="en-US" smtClean="0"/>
-              <a:t>2/3/20</a:t>
+              <a:t>1/25/2022</a:t>
             </a:fld>
             <a:endParaRPr lang="en-US"/>
           </a:p>
@@ -1351,7 +1345,7 @@
           <a:p>
             <a:fld id="{2691D6E4-0F7A-0249-86EF-226720E50E4C}" type="datetimeFigureOut">
               <a:rPr lang="en-US" smtClean="0"/>
-              <a:t>2/3/20</a:t>
+              <a:t>1/25/2022</a:t>
             </a:fld>
             <a:endParaRPr lang="en-US"/>
           </a:p>
@@ -1620,7 +1614,7 @@
           <a:p>
             <a:fld id="{2691D6E4-0F7A-0249-86EF-226720E50E4C}" type="datetimeFigureOut">
               <a:rPr lang="en-US" smtClean="0"/>
-              <a:t>2/3/20</a:t>
+              <a:t>1/25/2022</a:t>
             </a:fld>
             <a:endParaRPr lang="en-US"/>
           </a:p>
@@ -1929,7 +1923,7 @@
           <a:p>
             <a:fld id="{2691D6E4-0F7A-0249-86EF-226720E50E4C}" type="datetimeFigureOut">
               <a:rPr lang="en-US" smtClean="0"/>
-              <a:t>2/3/20</a:t>
+              <a:t>1/25/2022</a:t>
             </a:fld>
             <a:endParaRPr lang="en-US"/>
           </a:p>
@@ -2372,7 +2366,7 @@
           <a:p>
             <a:fld id="{2691D6E4-0F7A-0249-86EF-226720E50E4C}" type="datetimeFigureOut">
               <a:rPr lang="en-US" smtClean="0"/>
-              <a:t>2/3/20</a:t>
+              <a:t>1/25/2022</a:t>
             </a:fld>
             <a:endParaRPr lang="en-US"/>
           </a:p>
@@ -2513,7 +2507,7 @@
           <a:p>
             <a:fld id="{2691D6E4-0F7A-0249-86EF-226720E50E4C}" type="datetimeFigureOut">
               <a:rPr lang="en-US" smtClean="0"/>
-              <a:t>2/3/20</a:t>
+              <a:t>1/25/2022</a:t>
             </a:fld>
             <a:endParaRPr lang="en-US"/>
           </a:p>
@@ -2632,7 +2626,7 @@
           <a:p>
             <a:fld id="{2691D6E4-0F7A-0249-86EF-226720E50E4C}" type="datetimeFigureOut">
               <a:rPr lang="en-US" smtClean="0"/>
-              <a:t>2/3/20</a:t>
+              <a:t>1/25/2022</a:t>
             </a:fld>
             <a:endParaRPr lang="en-US"/>
           </a:p>
@@ -2931,7 +2925,7 @@
           <a:p>
             <a:fld id="{2691D6E4-0F7A-0249-86EF-226720E50E4C}" type="datetimeFigureOut">
               <a:rPr lang="en-US" smtClean="0"/>
-              <a:t>2/3/20</a:t>
+              <a:t>1/25/2022</a:t>
             </a:fld>
             <a:endParaRPr lang="en-US"/>
           </a:p>
@@ -3207,7 +3201,7 @@
           <a:p>
             <a:fld id="{2691D6E4-0F7A-0249-86EF-226720E50E4C}" type="datetimeFigureOut">
               <a:rPr lang="en-US" smtClean="0"/>
-              <a:t>2/3/20</a:t>
+              <a:t>1/25/2022</a:t>
             </a:fld>
             <a:endParaRPr lang="en-US"/>
           </a:p>
@@ -3850,8 +3844,13 @@
           <a:p>
             <a:r>
               <a:rPr lang="en-US" dirty="0"/>
-              <a:t>David A. C. Beck (dacb) &amp; Ting Cao</a:t>
-            </a:r>
+              <a:t>David A. C. Beck (</a:t>
+            </a:r>
+            <a:r>
+              <a:rPr lang="en-US"/>
+              <a:t>dacb)</a:t>
+            </a:r>
+            <a:endParaRPr lang="en-US" dirty="0"/>
           </a:p>
         </p:txBody>
       </p:sp>
@@ -4425,6 +4424,1334 @@
 </file>
 
 <file path=ppt/slides/slide3.xml><?xml version="1.0" encoding="utf-8"?>
+<p:sld xmlns:a="http://schemas.openxmlformats.org/drawingml/2006/main" xmlns:r="http://schemas.openxmlformats.org/officeDocument/2006/relationships" xmlns:p="http://schemas.openxmlformats.org/presentationml/2006/main">
+  <p:cSld>
+    <p:spTree>
+      <p:nvGrpSpPr>
+        <p:cNvPr id="1" name=""/>
+        <p:cNvGrpSpPr/>
+        <p:nvPr/>
+      </p:nvGrpSpPr>
+      <p:grpSpPr>
+        <a:xfrm>
+          <a:off x="0" y="0"/>
+          <a:ext cx="0" cy="0"/>
+          <a:chOff x="0" y="0"/>
+          <a:chExt cx="0" cy="0"/>
+        </a:xfrm>
+      </p:grpSpPr>
+      <p:sp>
+        <p:nvSpPr>
+          <p:cNvPr id="5" name="Title 4">
+            <a:extLst>
+              <a:ext uri="{FF2B5EF4-FFF2-40B4-BE49-F238E27FC236}">
+                <a16:creationId xmlns:a16="http://schemas.microsoft.com/office/drawing/2014/main" id="{97F57493-B916-2642-990B-7F9C1F51F6B2}"/>
+              </a:ext>
+            </a:extLst>
+          </p:cNvPr>
+          <p:cNvSpPr>
+            <a:spLocks noGrp="1"/>
+          </p:cNvSpPr>
+          <p:nvPr>
+            <p:ph type="title"/>
+          </p:nvPr>
+        </p:nvSpPr>
+        <p:spPr/>
+        <p:txBody>
+          <a:bodyPr/>
+          <a:lstStyle/>
+          <a:p>
+            <a:endParaRPr lang="en-US"/>
+          </a:p>
+        </p:txBody>
+      </p:sp>
+      <p:grpSp>
+        <p:nvGrpSpPr>
+          <p:cNvPr id="36" name="Group 35">
+            <a:extLst>
+              <a:ext uri="{FF2B5EF4-FFF2-40B4-BE49-F238E27FC236}">
+                <a16:creationId xmlns:a16="http://schemas.microsoft.com/office/drawing/2014/main" id="{3AE6B18C-0598-3847-B154-F6FB20D47AB0}"/>
+              </a:ext>
+            </a:extLst>
+          </p:cNvPr>
+          <p:cNvGrpSpPr/>
+          <p:nvPr/>
+        </p:nvGrpSpPr>
+        <p:grpSpPr>
+          <a:xfrm>
+            <a:off x="293077" y="3927174"/>
+            <a:ext cx="8505852" cy="2092011"/>
+            <a:chOff x="293077" y="3927174"/>
+            <a:chExt cx="8505852" cy="2092011"/>
+          </a:xfrm>
+        </p:grpSpPr>
+        <p:cxnSp>
+          <p:nvCxnSpPr>
+            <p:cNvPr id="10" name="Straight Connector 9">
+              <a:extLst>
+                <a:ext uri="{FF2B5EF4-FFF2-40B4-BE49-F238E27FC236}">
+                  <a16:creationId xmlns:a16="http://schemas.microsoft.com/office/drawing/2014/main" id="{D29A9411-2732-2F43-88D6-1264FB713BC9}"/>
+                </a:ext>
+              </a:extLst>
+            </p:cNvPr>
+            <p:cNvCxnSpPr>
+              <a:cxnSpLocks/>
+            </p:cNvCxnSpPr>
+            <p:nvPr/>
+          </p:nvCxnSpPr>
+          <p:spPr>
+            <a:xfrm>
+              <a:off x="4583723" y="4278923"/>
+              <a:ext cx="4009292" cy="0"/>
+            </a:xfrm>
+            <a:prstGeom prst="line">
+              <a:avLst/>
+            </a:prstGeom>
+            <a:ln w="63500">
+              <a:solidFill>
+                <a:srgbClr val="00FDFF"/>
+              </a:solidFill>
+            </a:ln>
+            <a:effectLst/>
+          </p:spPr>
+          <p:style>
+            <a:lnRef idx="2">
+              <a:schemeClr val="accent1"/>
+            </a:lnRef>
+            <a:fillRef idx="0">
+              <a:schemeClr val="accent1"/>
+            </a:fillRef>
+            <a:effectRef idx="1">
+              <a:schemeClr val="accent1"/>
+            </a:effectRef>
+            <a:fontRef idx="minor">
+              <a:schemeClr val="tx1"/>
+            </a:fontRef>
+          </p:style>
+        </p:cxnSp>
+        <p:cxnSp>
+          <p:nvCxnSpPr>
+            <p:cNvPr id="12" name="Straight Connector 11">
+              <a:extLst>
+                <a:ext uri="{FF2B5EF4-FFF2-40B4-BE49-F238E27FC236}">
+                  <a16:creationId xmlns:a16="http://schemas.microsoft.com/office/drawing/2014/main" id="{693C07D3-7F0B-3F4D-9B63-47108B532246}"/>
+                </a:ext>
+              </a:extLst>
+            </p:cNvPr>
+            <p:cNvCxnSpPr>
+              <a:cxnSpLocks/>
+            </p:cNvCxnSpPr>
+            <p:nvPr/>
+          </p:nvCxnSpPr>
+          <p:spPr>
+            <a:xfrm>
+              <a:off x="574431" y="4278923"/>
+              <a:ext cx="4009292" cy="0"/>
+            </a:xfrm>
+            <a:prstGeom prst="line">
+              <a:avLst/>
+            </a:prstGeom>
+            <a:ln w="63500">
+              <a:solidFill>
+                <a:srgbClr val="FF40FF"/>
+              </a:solidFill>
+            </a:ln>
+            <a:effectLst/>
+          </p:spPr>
+          <p:style>
+            <a:lnRef idx="2">
+              <a:schemeClr val="accent1"/>
+            </a:lnRef>
+            <a:fillRef idx="0">
+              <a:schemeClr val="accent1"/>
+            </a:fillRef>
+            <a:effectRef idx="1">
+              <a:schemeClr val="accent1"/>
+            </a:effectRef>
+            <a:fontRef idx="minor">
+              <a:schemeClr val="tx1"/>
+            </a:fontRef>
+          </p:style>
+        </p:cxnSp>
+        <p:cxnSp>
+          <p:nvCxnSpPr>
+            <p:cNvPr id="13" name="Straight Connector 12">
+              <a:extLst>
+                <a:ext uri="{FF2B5EF4-FFF2-40B4-BE49-F238E27FC236}">
+                  <a16:creationId xmlns:a16="http://schemas.microsoft.com/office/drawing/2014/main" id="{F60851F5-A0FE-0D44-9A09-E793EA323689}"/>
+                </a:ext>
+              </a:extLst>
+            </p:cNvPr>
+            <p:cNvCxnSpPr>
+              <a:cxnSpLocks/>
+            </p:cNvCxnSpPr>
+            <p:nvPr/>
+          </p:nvCxnSpPr>
+          <p:spPr>
+            <a:xfrm>
+              <a:off x="4583723" y="3938954"/>
+              <a:ext cx="0" cy="679938"/>
+            </a:xfrm>
+            <a:prstGeom prst="line">
+              <a:avLst/>
+            </a:prstGeom>
+            <a:ln w="63500">
+              <a:solidFill>
+                <a:schemeClr val="tx1"/>
+              </a:solidFill>
+            </a:ln>
+            <a:effectLst/>
+          </p:spPr>
+          <p:style>
+            <a:lnRef idx="2">
+              <a:schemeClr val="accent1"/>
+            </a:lnRef>
+            <a:fillRef idx="0">
+              <a:schemeClr val="accent1"/>
+            </a:fillRef>
+            <a:effectRef idx="1">
+              <a:schemeClr val="accent1"/>
+            </a:effectRef>
+            <a:fontRef idx="minor">
+              <a:schemeClr val="tx1"/>
+            </a:fontRef>
+          </p:style>
+        </p:cxnSp>
+        <p:cxnSp>
+          <p:nvCxnSpPr>
+            <p:cNvPr id="15" name="Straight Connector 14">
+              <a:extLst>
+                <a:ext uri="{FF2B5EF4-FFF2-40B4-BE49-F238E27FC236}">
+                  <a16:creationId xmlns:a16="http://schemas.microsoft.com/office/drawing/2014/main" id="{2D42909A-CFDF-BB46-9822-BE69B46F075E}"/>
+                </a:ext>
+              </a:extLst>
+            </p:cNvPr>
+            <p:cNvCxnSpPr>
+              <a:cxnSpLocks/>
+            </p:cNvCxnSpPr>
+            <p:nvPr/>
+          </p:nvCxnSpPr>
+          <p:spPr>
+            <a:xfrm>
+              <a:off x="8581292" y="3938954"/>
+              <a:ext cx="0" cy="679938"/>
+            </a:xfrm>
+            <a:prstGeom prst="line">
+              <a:avLst/>
+            </a:prstGeom>
+            <a:ln w="63500">
+              <a:solidFill>
+                <a:srgbClr val="00FDFF"/>
+              </a:solidFill>
+            </a:ln>
+            <a:effectLst/>
+          </p:spPr>
+          <p:style>
+            <a:lnRef idx="2">
+              <a:schemeClr val="accent1"/>
+            </a:lnRef>
+            <a:fillRef idx="0">
+              <a:schemeClr val="accent1"/>
+            </a:fillRef>
+            <a:effectRef idx="1">
+              <a:schemeClr val="accent1"/>
+            </a:effectRef>
+            <a:fontRef idx="minor">
+              <a:schemeClr val="tx1"/>
+            </a:fontRef>
+          </p:style>
+        </p:cxnSp>
+        <p:cxnSp>
+          <p:nvCxnSpPr>
+            <p:cNvPr id="16" name="Straight Connector 15">
+              <a:extLst>
+                <a:ext uri="{FF2B5EF4-FFF2-40B4-BE49-F238E27FC236}">
+                  <a16:creationId xmlns:a16="http://schemas.microsoft.com/office/drawing/2014/main" id="{4DE28BAB-1F33-5B4B-97F9-3D0879FB7CF6}"/>
+                </a:ext>
+              </a:extLst>
+            </p:cNvPr>
+            <p:cNvCxnSpPr>
+              <a:cxnSpLocks/>
+            </p:cNvCxnSpPr>
+            <p:nvPr/>
+          </p:nvCxnSpPr>
+          <p:spPr>
+            <a:xfrm>
+              <a:off x="574431" y="3938954"/>
+              <a:ext cx="0" cy="679938"/>
+            </a:xfrm>
+            <a:prstGeom prst="line">
+              <a:avLst/>
+            </a:prstGeom>
+            <a:ln w="63500">
+              <a:solidFill>
+                <a:srgbClr val="FF40FF"/>
+              </a:solidFill>
+            </a:ln>
+            <a:effectLst/>
+          </p:spPr>
+          <p:style>
+            <a:lnRef idx="2">
+              <a:schemeClr val="accent1"/>
+            </a:lnRef>
+            <a:fillRef idx="0">
+              <a:schemeClr val="accent1"/>
+            </a:fillRef>
+            <a:effectRef idx="1">
+              <a:schemeClr val="accent1"/>
+            </a:effectRef>
+            <a:fontRef idx="minor">
+              <a:schemeClr val="tx1"/>
+            </a:fontRef>
+          </p:style>
+        </p:cxnSp>
+        <p:sp>
+          <p:nvSpPr>
+            <p:cNvPr id="17" name="TextBox 16">
+              <a:extLst>
+                <a:ext uri="{FF2B5EF4-FFF2-40B4-BE49-F238E27FC236}">
+                  <a16:creationId xmlns:a16="http://schemas.microsoft.com/office/drawing/2014/main" id="{CE47B5E8-14C7-3844-8FC2-429203F6CB99}"/>
+                </a:ext>
+              </a:extLst>
+            </p:cNvPr>
+            <p:cNvSpPr txBox="1"/>
+            <p:nvPr/>
+          </p:nvSpPr>
+          <p:spPr>
+            <a:xfrm>
+              <a:off x="293077" y="4841631"/>
+              <a:ext cx="478016" cy="523220"/>
+            </a:xfrm>
+            <a:prstGeom prst="rect">
+              <a:avLst/>
+            </a:prstGeom>
+            <a:noFill/>
+          </p:spPr>
+          <p:txBody>
+            <a:bodyPr wrap="none" rtlCol="0">
+              <a:spAutoFit/>
+            </a:bodyPr>
+            <a:lstStyle/>
+            <a:p>
+              <a:r>
+                <a:rPr lang="en-US" sz="2800" dirty="0">
+                  <a:solidFill>
+                    <a:srgbClr val="FF40FF"/>
+                  </a:solidFill>
+                </a:rPr>
+                <a:t>-1</a:t>
+              </a:r>
+            </a:p>
+          </p:txBody>
+        </p:sp>
+        <p:sp>
+          <p:nvSpPr>
+            <p:cNvPr id="18" name="TextBox 17">
+              <a:extLst>
+                <a:ext uri="{FF2B5EF4-FFF2-40B4-BE49-F238E27FC236}">
+                  <a16:creationId xmlns:a16="http://schemas.microsoft.com/office/drawing/2014/main" id="{F30164D0-D01D-9742-A899-B80DDF57537B}"/>
+                </a:ext>
+              </a:extLst>
+            </p:cNvPr>
+            <p:cNvSpPr txBox="1"/>
+            <p:nvPr/>
+          </p:nvSpPr>
+          <p:spPr>
+            <a:xfrm>
+              <a:off x="8431521" y="4841631"/>
+              <a:ext cx="367408" cy="523220"/>
+            </a:xfrm>
+            <a:prstGeom prst="rect">
+              <a:avLst/>
+            </a:prstGeom>
+            <a:noFill/>
+          </p:spPr>
+          <p:txBody>
+            <a:bodyPr wrap="none" rtlCol="0">
+              <a:spAutoFit/>
+            </a:bodyPr>
+            <a:lstStyle/>
+            <a:p>
+              <a:r>
+                <a:rPr lang="en-US" sz="2800" dirty="0">
+                  <a:solidFill>
+                    <a:srgbClr val="00FDFF"/>
+                  </a:solidFill>
+                </a:rPr>
+                <a:t>1</a:t>
+              </a:r>
+            </a:p>
+          </p:txBody>
+        </p:sp>
+        <p:sp>
+          <p:nvSpPr>
+            <p:cNvPr id="19" name="TextBox 18">
+              <a:extLst>
+                <a:ext uri="{FF2B5EF4-FFF2-40B4-BE49-F238E27FC236}">
+                  <a16:creationId xmlns:a16="http://schemas.microsoft.com/office/drawing/2014/main" id="{9287D1CB-7891-8448-ADE5-984F550E99B6}"/>
+                </a:ext>
+              </a:extLst>
+            </p:cNvPr>
+            <p:cNvSpPr txBox="1"/>
+            <p:nvPr/>
+          </p:nvSpPr>
+          <p:spPr>
+            <a:xfrm>
+              <a:off x="4417603" y="4841631"/>
+              <a:ext cx="367408" cy="523220"/>
+            </a:xfrm>
+            <a:prstGeom prst="rect">
+              <a:avLst/>
+            </a:prstGeom>
+            <a:noFill/>
+          </p:spPr>
+          <p:txBody>
+            <a:bodyPr wrap="none" rtlCol="0">
+              <a:spAutoFit/>
+            </a:bodyPr>
+            <a:lstStyle/>
+            <a:p>
+              <a:r>
+                <a:rPr lang="en-US" sz="2800" dirty="0"/>
+                <a:t>0</a:t>
+              </a:r>
+            </a:p>
+          </p:txBody>
+        </p:sp>
+        <p:sp>
+          <p:nvSpPr>
+            <p:cNvPr id="20" name="TextBox 19">
+              <a:extLst>
+                <a:ext uri="{FF2B5EF4-FFF2-40B4-BE49-F238E27FC236}">
+                  <a16:creationId xmlns:a16="http://schemas.microsoft.com/office/drawing/2014/main" id="{44912C4A-9ED5-154B-B15B-69E809AB6BDE}"/>
+                </a:ext>
+              </a:extLst>
+            </p:cNvPr>
+            <p:cNvSpPr txBox="1"/>
+            <p:nvPr/>
+          </p:nvSpPr>
+          <p:spPr>
+            <a:xfrm>
+              <a:off x="2147945" y="4841631"/>
+              <a:ext cx="752129" cy="523220"/>
+            </a:xfrm>
+            <a:prstGeom prst="rect">
+              <a:avLst/>
+            </a:prstGeom>
+            <a:noFill/>
+          </p:spPr>
+          <p:txBody>
+            <a:bodyPr wrap="none" rtlCol="0">
+              <a:spAutoFit/>
+            </a:bodyPr>
+            <a:lstStyle/>
+            <a:p>
+              <a:r>
+                <a:rPr lang="en-US" sz="2800" dirty="0">
+                  <a:solidFill>
+                    <a:srgbClr val="FF40FF"/>
+                  </a:solidFill>
+                </a:rPr>
+                <a:t>-0.5</a:t>
+              </a:r>
+            </a:p>
+          </p:txBody>
+        </p:sp>
+        <p:sp>
+          <p:nvSpPr>
+            <p:cNvPr id="21" name="TextBox 20">
+              <a:extLst>
+                <a:ext uri="{FF2B5EF4-FFF2-40B4-BE49-F238E27FC236}">
+                  <a16:creationId xmlns:a16="http://schemas.microsoft.com/office/drawing/2014/main" id="{42CA3A2E-3AE3-B14F-AEEE-FD2D5C4355D3}"/>
+                </a:ext>
+              </a:extLst>
+            </p:cNvPr>
+            <p:cNvSpPr txBox="1"/>
+            <p:nvPr/>
+          </p:nvSpPr>
+          <p:spPr>
+            <a:xfrm>
+              <a:off x="6302540" y="4841631"/>
+              <a:ext cx="641522" cy="523220"/>
+            </a:xfrm>
+            <a:prstGeom prst="rect">
+              <a:avLst/>
+            </a:prstGeom>
+            <a:noFill/>
+          </p:spPr>
+          <p:txBody>
+            <a:bodyPr wrap="none" rtlCol="0">
+              <a:spAutoFit/>
+            </a:bodyPr>
+            <a:lstStyle/>
+            <a:p>
+              <a:r>
+                <a:rPr lang="en-US" sz="2800" dirty="0">
+                  <a:solidFill>
+                    <a:srgbClr val="00FDFF"/>
+                  </a:solidFill>
+                </a:rPr>
+                <a:t>0.5</a:t>
+              </a:r>
+            </a:p>
+          </p:txBody>
+        </p:sp>
+        <p:cxnSp>
+          <p:nvCxnSpPr>
+            <p:cNvPr id="22" name="Straight Connector 21">
+              <a:extLst>
+                <a:ext uri="{FF2B5EF4-FFF2-40B4-BE49-F238E27FC236}">
+                  <a16:creationId xmlns:a16="http://schemas.microsoft.com/office/drawing/2014/main" id="{14F7B9ED-EE0C-0246-AAE4-2F01E3F348C9}"/>
+                </a:ext>
+              </a:extLst>
+            </p:cNvPr>
+            <p:cNvCxnSpPr>
+              <a:cxnSpLocks/>
+            </p:cNvCxnSpPr>
+            <p:nvPr/>
+          </p:nvCxnSpPr>
+          <p:spPr>
+            <a:xfrm>
+              <a:off x="2570901" y="4126521"/>
+              <a:ext cx="0" cy="339970"/>
+            </a:xfrm>
+            <a:prstGeom prst="line">
+              <a:avLst/>
+            </a:prstGeom>
+            <a:ln w="63500">
+              <a:solidFill>
+                <a:srgbClr val="FF40FF"/>
+              </a:solidFill>
+            </a:ln>
+            <a:effectLst/>
+          </p:spPr>
+          <p:style>
+            <a:lnRef idx="2">
+              <a:schemeClr val="accent1"/>
+            </a:lnRef>
+            <a:fillRef idx="0">
+              <a:schemeClr val="accent1"/>
+            </a:fillRef>
+            <a:effectRef idx="1">
+              <a:schemeClr val="accent1"/>
+            </a:effectRef>
+            <a:fontRef idx="minor">
+              <a:schemeClr val="tx1"/>
+            </a:fontRef>
+          </p:style>
+        </p:cxnSp>
+        <p:cxnSp>
+          <p:nvCxnSpPr>
+            <p:cNvPr id="23" name="Straight Connector 22">
+              <a:extLst>
+                <a:ext uri="{FF2B5EF4-FFF2-40B4-BE49-F238E27FC236}">
+                  <a16:creationId xmlns:a16="http://schemas.microsoft.com/office/drawing/2014/main" id="{B6C81516-8587-6C49-B6D2-94BD46328114}"/>
+                </a:ext>
+              </a:extLst>
+            </p:cNvPr>
+            <p:cNvCxnSpPr>
+              <a:cxnSpLocks/>
+            </p:cNvCxnSpPr>
+            <p:nvPr/>
+          </p:nvCxnSpPr>
+          <p:spPr>
+            <a:xfrm>
+              <a:off x="6588369" y="4108938"/>
+              <a:ext cx="0" cy="339969"/>
+            </a:xfrm>
+            <a:prstGeom prst="line">
+              <a:avLst/>
+            </a:prstGeom>
+            <a:ln w="63500">
+              <a:solidFill>
+                <a:srgbClr val="00FDFF"/>
+              </a:solidFill>
+            </a:ln>
+            <a:effectLst/>
+          </p:spPr>
+          <p:style>
+            <a:lnRef idx="2">
+              <a:schemeClr val="accent1"/>
+            </a:lnRef>
+            <a:fillRef idx="0">
+              <a:schemeClr val="accent1"/>
+            </a:fillRef>
+            <a:effectRef idx="1">
+              <a:schemeClr val="accent1"/>
+            </a:effectRef>
+            <a:fontRef idx="minor">
+              <a:schemeClr val="tx1"/>
+            </a:fontRef>
+          </p:style>
+        </p:cxnSp>
+        <p:sp>
+          <p:nvSpPr>
+            <p:cNvPr id="26" name="TextBox 25">
+              <a:extLst>
+                <a:ext uri="{FF2B5EF4-FFF2-40B4-BE49-F238E27FC236}">
+                  <a16:creationId xmlns:a16="http://schemas.microsoft.com/office/drawing/2014/main" id="{1DCFE945-CCFA-1540-BCB2-A57ED49406BF}"/>
+                </a:ext>
+              </a:extLst>
+            </p:cNvPr>
+            <p:cNvSpPr txBox="1"/>
+            <p:nvPr/>
+          </p:nvSpPr>
+          <p:spPr>
+            <a:xfrm>
+              <a:off x="1002459" y="5478381"/>
+              <a:ext cx="3136884" cy="523220"/>
+            </a:xfrm>
+            <a:prstGeom prst="rect">
+              <a:avLst/>
+            </a:prstGeom>
+            <a:noFill/>
+          </p:spPr>
+          <p:txBody>
+            <a:bodyPr wrap="none" rtlCol="0">
+              <a:spAutoFit/>
+            </a:bodyPr>
+            <a:lstStyle/>
+            <a:p>
+              <a:r>
+                <a:rPr lang="en-US" sz="2800" dirty="0">
+                  <a:solidFill>
+                    <a:srgbClr val="FF40FF"/>
+                  </a:solidFill>
+                </a:rPr>
+                <a:t>Negative correlation</a:t>
+              </a:r>
+            </a:p>
+          </p:txBody>
+        </p:sp>
+        <p:sp>
+          <p:nvSpPr>
+            <p:cNvPr id="27" name="TextBox 26">
+              <a:extLst>
+                <a:ext uri="{FF2B5EF4-FFF2-40B4-BE49-F238E27FC236}">
+                  <a16:creationId xmlns:a16="http://schemas.microsoft.com/office/drawing/2014/main" id="{F844B5BE-DD99-8349-9839-EDD54AB9DFE5}"/>
+                </a:ext>
+              </a:extLst>
+            </p:cNvPr>
+            <p:cNvSpPr txBox="1"/>
+            <p:nvPr/>
+          </p:nvSpPr>
+          <p:spPr>
+            <a:xfrm>
+              <a:off x="5019927" y="5495965"/>
+              <a:ext cx="2987421" cy="523220"/>
+            </a:xfrm>
+            <a:prstGeom prst="rect">
+              <a:avLst/>
+            </a:prstGeom>
+            <a:noFill/>
+          </p:spPr>
+          <p:txBody>
+            <a:bodyPr wrap="none" rtlCol="0">
+              <a:spAutoFit/>
+            </a:bodyPr>
+            <a:lstStyle/>
+            <a:p>
+              <a:r>
+                <a:rPr lang="en-US" sz="2800" dirty="0">
+                  <a:solidFill>
+                    <a:srgbClr val="00FDFF"/>
+                  </a:solidFill>
+                </a:rPr>
+                <a:t>Positive correlation</a:t>
+              </a:r>
+            </a:p>
+          </p:txBody>
+        </p:sp>
+        <p:sp>
+          <p:nvSpPr>
+            <p:cNvPr id="28" name="TextBox 27">
+              <a:extLst>
+                <a:ext uri="{FF2B5EF4-FFF2-40B4-BE49-F238E27FC236}">
+                  <a16:creationId xmlns:a16="http://schemas.microsoft.com/office/drawing/2014/main" id="{A7BB70DF-39DF-0049-B2DC-066B1B271274}"/>
+                </a:ext>
+              </a:extLst>
+            </p:cNvPr>
+            <p:cNvSpPr txBox="1"/>
+            <p:nvPr/>
+          </p:nvSpPr>
+          <p:spPr>
+            <a:xfrm>
+              <a:off x="558080" y="3927174"/>
+              <a:ext cx="796500" cy="369332"/>
+            </a:xfrm>
+            <a:prstGeom prst="rect">
+              <a:avLst/>
+            </a:prstGeom>
+            <a:noFill/>
+          </p:spPr>
+          <p:txBody>
+            <a:bodyPr wrap="none" rtlCol="0">
+              <a:spAutoFit/>
+            </a:bodyPr>
+            <a:lstStyle/>
+            <a:p>
+              <a:r>
+                <a:rPr lang="en-US" dirty="0"/>
+                <a:t>Strong</a:t>
+              </a:r>
+            </a:p>
+          </p:txBody>
+        </p:sp>
+        <p:sp>
+          <p:nvSpPr>
+            <p:cNvPr id="29" name="TextBox 28">
+              <a:extLst>
+                <a:ext uri="{FF2B5EF4-FFF2-40B4-BE49-F238E27FC236}">
+                  <a16:creationId xmlns:a16="http://schemas.microsoft.com/office/drawing/2014/main" id="{89A7911D-182A-794C-8FCE-9AC7A841446D}"/>
+                </a:ext>
+              </a:extLst>
+            </p:cNvPr>
+            <p:cNvSpPr txBox="1"/>
+            <p:nvPr/>
+          </p:nvSpPr>
+          <p:spPr>
+            <a:xfrm>
+              <a:off x="7841658" y="3927174"/>
+              <a:ext cx="796500" cy="369332"/>
+            </a:xfrm>
+            <a:prstGeom prst="rect">
+              <a:avLst/>
+            </a:prstGeom>
+            <a:noFill/>
+          </p:spPr>
+          <p:txBody>
+            <a:bodyPr wrap="none" rtlCol="0">
+              <a:spAutoFit/>
+            </a:bodyPr>
+            <a:lstStyle/>
+            <a:p>
+              <a:r>
+                <a:rPr lang="en-US" dirty="0"/>
+                <a:t>Strong</a:t>
+              </a:r>
+            </a:p>
+          </p:txBody>
+        </p:sp>
+        <p:sp>
+          <p:nvSpPr>
+            <p:cNvPr id="30" name="TextBox 29">
+              <a:extLst>
+                <a:ext uri="{FF2B5EF4-FFF2-40B4-BE49-F238E27FC236}">
+                  <a16:creationId xmlns:a16="http://schemas.microsoft.com/office/drawing/2014/main" id="{9629655F-D10B-FB48-9755-B29A675665F0}"/>
+                </a:ext>
+              </a:extLst>
+            </p:cNvPr>
+            <p:cNvSpPr txBox="1"/>
+            <p:nvPr/>
+          </p:nvSpPr>
+          <p:spPr>
+            <a:xfrm>
+              <a:off x="4621677" y="3927174"/>
+              <a:ext cx="711605" cy="369332"/>
+            </a:xfrm>
+            <a:prstGeom prst="rect">
+              <a:avLst/>
+            </a:prstGeom>
+            <a:noFill/>
+          </p:spPr>
+          <p:txBody>
+            <a:bodyPr wrap="none" rtlCol="0">
+              <a:spAutoFit/>
+            </a:bodyPr>
+            <a:lstStyle/>
+            <a:p>
+              <a:r>
+                <a:rPr lang="en-US" dirty="0"/>
+                <a:t>Weak</a:t>
+              </a:r>
+            </a:p>
+          </p:txBody>
+        </p:sp>
+        <p:sp>
+          <p:nvSpPr>
+            <p:cNvPr id="31" name="TextBox 30">
+              <a:extLst>
+                <a:ext uri="{FF2B5EF4-FFF2-40B4-BE49-F238E27FC236}">
+                  <a16:creationId xmlns:a16="http://schemas.microsoft.com/office/drawing/2014/main" id="{EF05AED4-C504-DA46-8A99-FDC758213EB2}"/>
+                </a:ext>
+              </a:extLst>
+            </p:cNvPr>
+            <p:cNvSpPr txBox="1"/>
+            <p:nvPr/>
+          </p:nvSpPr>
+          <p:spPr>
+            <a:xfrm>
+              <a:off x="3834165" y="3927174"/>
+              <a:ext cx="711605" cy="369332"/>
+            </a:xfrm>
+            <a:prstGeom prst="rect">
+              <a:avLst/>
+            </a:prstGeom>
+            <a:noFill/>
+          </p:spPr>
+          <p:txBody>
+            <a:bodyPr wrap="none" rtlCol="0">
+              <a:spAutoFit/>
+            </a:bodyPr>
+            <a:lstStyle/>
+            <a:p>
+              <a:r>
+                <a:rPr lang="en-US" dirty="0"/>
+                <a:t>Weak</a:t>
+              </a:r>
+            </a:p>
+          </p:txBody>
+        </p:sp>
+        <p:cxnSp>
+          <p:nvCxnSpPr>
+            <p:cNvPr id="33" name="Straight Arrow Connector 32">
+              <a:extLst>
+                <a:ext uri="{FF2B5EF4-FFF2-40B4-BE49-F238E27FC236}">
+                  <a16:creationId xmlns:a16="http://schemas.microsoft.com/office/drawing/2014/main" id="{7FCCEF73-781E-C549-8579-6B161354982C}"/>
+                </a:ext>
+              </a:extLst>
+            </p:cNvPr>
+            <p:cNvCxnSpPr>
+              <a:stCxn id="31" idx="1"/>
+              <a:endCxn id="28" idx="3"/>
+            </p:cNvCxnSpPr>
+            <p:nvPr/>
+          </p:nvCxnSpPr>
+          <p:spPr>
+            <a:xfrm flipH="1">
+              <a:off x="1354580" y="4111840"/>
+              <a:ext cx="2479585" cy="0"/>
+            </a:xfrm>
+            <a:prstGeom prst="straightConnector1">
+              <a:avLst/>
+            </a:prstGeom>
+            <a:ln>
+              <a:solidFill>
+                <a:schemeClr val="tx1"/>
+              </a:solidFill>
+              <a:headEnd w="lg" len="lg"/>
+              <a:tailEnd type="triangle" w="lg" len="lg"/>
+            </a:ln>
+            <a:effectLst/>
+          </p:spPr>
+          <p:style>
+            <a:lnRef idx="2">
+              <a:schemeClr val="accent1"/>
+            </a:lnRef>
+            <a:fillRef idx="0">
+              <a:schemeClr val="accent1"/>
+            </a:fillRef>
+            <a:effectRef idx="1">
+              <a:schemeClr val="accent1"/>
+            </a:effectRef>
+            <a:fontRef idx="minor">
+              <a:schemeClr val="tx1"/>
+            </a:fontRef>
+          </p:style>
+        </p:cxnSp>
+        <p:cxnSp>
+          <p:nvCxnSpPr>
+            <p:cNvPr id="34" name="Straight Arrow Connector 33">
+              <a:extLst>
+                <a:ext uri="{FF2B5EF4-FFF2-40B4-BE49-F238E27FC236}">
+                  <a16:creationId xmlns:a16="http://schemas.microsoft.com/office/drawing/2014/main" id="{74059D5F-E03B-CD42-86D8-D98BCE67A9FA}"/>
+                </a:ext>
+              </a:extLst>
+            </p:cNvPr>
+            <p:cNvCxnSpPr>
+              <a:cxnSpLocks/>
+            </p:cNvCxnSpPr>
+            <p:nvPr/>
+          </p:nvCxnSpPr>
+          <p:spPr>
+            <a:xfrm>
+              <a:off x="5265316" y="4120659"/>
+              <a:ext cx="2586550" cy="2902"/>
+            </a:xfrm>
+            <a:prstGeom prst="straightConnector1">
+              <a:avLst/>
+            </a:prstGeom>
+            <a:ln>
+              <a:solidFill>
+                <a:schemeClr val="tx1"/>
+              </a:solidFill>
+              <a:headEnd w="lg" len="lg"/>
+              <a:tailEnd type="triangle" w="lg" len="lg"/>
+            </a:ln>
+            <a:effectLst/>
+          </p:spPr>
+          <p:style>
+            <a:lnRef idx="2">
+              <a:schemeClr val="accent1"/>
+            </a:lnRef>
+            <a:fillRef idx="0">
+              <a:schemeClr val="accent1"/>
+            </a:fillRef>
+            <a:effectRef idx="1">
+              <a:schemeClr val="accent1"/>
+            </a:effectRef>
+            <a:fontRef idx="minor">
+              <a:schemeClr val="tx1"/>
+            </a:fontRef>
+          </p:style>
+        </p:cxnSp>
+      </p:grpSp>
+    </p:spTree>
+    <p:extLst>
+      <p:ext uri="{BB962C8B-B14F-4D97-AF65-F5344CB8AC3E}">
+        <p14:creationId xmlns:p14="http://schemas.microsoft.com/office/powerpoint/2010/main" val="1809929805"/>
+      </p:ext>
+    </p:extLst>
+  </p:cSld>
+  <p:clrMapOvr>
+    <a:masterClrMapping/>
+  </p:clrMapOvr>
+</p:sld>
+</file>
+
+<file path=ppt/slides/slide4.xml><?xml version="1.0" encoding="utf-8"?>
+<p:sld xmlns:a="http://schemas.openxmlformats.org/drawingml/2006/main" xmlns:r="http://schemas.openxmlformats.org/officeDocument/2006/relationships" xmlns:p="http://schemas.openxmlformats.org/presentationml/2006/main">
+  <p:cSld>
+    <p:spTree>
+      <p:nvGrpSpPr>
+        <p:cNvPr id="1" name=""/>
+        <p:cNvGrpSpPr/>
+        <p:nvPr/>
+      </p:nvGrpSpPr>
+      <p:grpSpPr>
+        <a:xfrm>
+          <a:off x="0" y="0"/>
+          <a:ext cx="0" cy="0"/>
+          <a:chOff x="0" y="0"/>
+          <a:chExt cx="0" cy="0"/>
+        </a:xfrm>
+      </p:grpSpPr>
+      <p:grpSp>
+        <p:nvGrpSpPr>
+          <p:cNvPr id="9" name="Group 8">
+            <a:extLst>
+              <a:ext uri="{FF2B5EF4-FFF2-40B4-BE49-F238E27FC236}">
+                <a16:creationId xmlns:a16="http://schemas.microsoft.com/office/drawing/2014/main" id="{C8351DD0-9C4D-2341-A277-A634ECC5C773}"/>
+              </a:ext>
+            </a:extLst>
+          </p:cNvPr>
+          <p:cNvGrpSpPr/>
+          <p:nvPr/>
+        </p:nvGrpSpPr>
+        <p:grpSpPr>
+          <a:xfrm>
+            <a:off x="-5972" y="1763005"/>
+            <a:ext cx="9630618" cy="3589894"/>
+            <a:chOff x="-5972" y="1763005"/>
+            <a:chExt cx="9630618" cy="3589894"/>
+          </a:xfrm>
+        </p:grpSpPr>
+        <p:pic>
+          <p:nvPicPr>
+            <p:cNvPr id="2" name="Picture 1">
+              <a:extLst>
+                <a:ext uri="{FF2B5EF4-FFF2-40B4-BE49-F238E27FC236}">
+                  <a16:creationId xmlns:a16="http://schemas.microsoft.com/office/drawing/2014/main" id="{A699544E-CE52-1242-AB81-1AB30FEF8B47}"/>
+                </a:ext>
+              </a:extLst>
+            </p:cNvPr>
+            <p:cNvPicPr>
+              <a:picLocks noChangeAspect="1"/>
+            </p:cNvPicPr>
+            <p:nvPr/>
+          </p:nvPicPr>
+          <p:blipFill>
+            <a:blip r:embed="rId2"/>
+            <a:stretch>
+              <a:fillRect/>
+            </a:stretch>
+          </p:blipFill>
+          <p:spPr>
+            <a:xfrm>
+              <a:off x="480646" y="1900905"/>
+              <a:ext cx="9144000" cy="3314095"/>
+            </a:xfrm>
+            <a:prstGeom prst="rect">
+              <a:avLst/>
+            </a:prstGeom>
+          </p:spPr>
+        </p:pic>
+        <p:sp>
+          <p:nvSpPr>
+            <p:cNvPr id="3" name="Rectangle 2">
+              <a:extLst>
+                <a:ext uri="{FF2B5EF4-FFF2-40B4-BE49-F238E27FC236}">
+                  <a16:creationId xmlns:a16="http://schemas.microsoft.com/office/drawing/2014/main" id="{882C35B2-CD5E-C445-BDF3-68784081C05B}"/>
+                </a:ext>
+              </a:extLst>
+            </p:cNvPr>
+            <p:cNvSpPr/>
+            <p:nvPr/>
+          </p:nvSpPr>
+          <p:spPr>
+            <a:xfrm>
+              <a:off x="656492" y="4792971"/>
+              <a:ext cx="1230923" cy="422029"/>
+            </a:xfrm>
+            <a:prstGeom prst="rect">
+              <a:avLst/>
+            </a:prstGeom>
+            <a:noFill/>
+            <a:ln w="63500">
+              <a:solidFill>
+                <a:srgbClr val="00FDFF"/>
+              </a:solidFill>
+            </a:ln>
+            <a:effectLst/>
+          </p:spPr>
+          <p:style>
+            <a:lnRef idx="1">
+              <a:schemeClr val="accent1"/>
+            </a:lnRef>
+            <a:fillRef idx="3">
+              <a:schemeClr val="accent1"/>
+            </a:fillRef>
+            <a:effectRef idx="2">
+              <a:schemeClr val="accent1"/>
+            </a:effectRef>
+            <a:fontRef idx="minor">
+              <a:schemeClr val="lt1"/>
+            </a:fontRef>
+          </p:style>
+          <p:txBody>
+            <a:bodyPr rtlCol="0" anchor="ctr"/>
+            <a:lstStyle/>
+            <a:p>
+              <a:pPr algn="ctr"/>
+              <a:endParaRPr lang="en-US"/>
+            </a:p>
+          </p:txBody>
+        </p:sp>
+        <p:sp>
+          <p:nvSpPr>
+            <p:cNvPr id="32" name="Rectangle 31">
+              <a:extLst>
+                <a:ext uri="{FF2B5EF4-FFF2-40B4-BE49-F238E27FC236}">
+                  <a16:creationId xmlns:a16="http://schemas.microsoft.com/office/drawing/2014/main" id="{54455F76-8FDF-DC49-8CAC-31DEDE8EA434}"/>
+                </a:ext>
+              </a:extLst>
+            </p:cNvPr>
+            <p:cNvSpPr/>
+            <p:nvPr/>
+          </p:nvSpPr>
+          <p:spPr>
+            <a:xfrm>
+              <a:off x="1934307" y="4791781"/>
+              <a:ext cx="3575539" cy="423220"/>
+            </a:xfrm>
+            <a:prstGeom prst="rect">
+              <a:avLst/>
+            </a:prstGeom>
+            <a:noFill/>
+            <a:ln w="63500">
+              <a:solidFill>
+                <a:srgbClr val="FF40FF"/>
+              </a:solidFill>
+            </a:ln>
+            <a:effectLst/>
+          </p:spPr>
+          <p:style>
+            <a:lnRef idx="1">
+              <a:schemeClr val="accent1"/>
+            </a:lnRef>
+            <a:fillRef idx="3">
+              <a:schemeClr val="accent1"/>
+            </a:fillRef>
+            <a:effectRef idx="2">
+              <a:schemeClr val="accent1"/>
+            </a:effectRef>
+            <a:fontRef idx="minor">
+              <a:schemeClr val="lt1"/>
+            </a:fontRef>
+          </p:style>
+          <p:txBody>
+            <a:bodyPr rtlCol="0" anchor="ctr"/>
+            <a:lstStyle/>
+            <a:p>
+              <a:pPr algn="ctr"/>
+              <a:endParaRPr lang="en-US">
+                <a:solidFill>
+                  <a:srgbClr val="FF40FF"/>
+                </a:solidFill>
+              </a:endParaRPr>
+            </a:p>
+          </p:txBody>
+        </p:sp>
+        <p:cxnSp>
+          <p:nvCxnSpPr>
+            <p:cNvPr id="6" name="Straight Arrow Connector 5">
+              <a:extLst>
+                <a:ext uri="{FF2B5EF4-FFF2-40B4-BE49-F238E27FC236}">
+                  <a16:creationId xmlns:a16="http://schemas.microsoft.com/office/drawing/2014/main" id="{E5CA6BF8-6A03-8E47-98FC-48670E8A7C9E}"/>
+                </a:ext>
+              </a:extLst>
+            </p:cNvPr>
+            <p:cNvCxnSpPr/>
+            <p:nvPr/>
+          </p:nvCxnSpPr>
+          <p:spPr>
+            <a:xfrm flipV="1">
+              <a:off x="480646" y="2195297"/>
+              <a:ext cx="0" cy="3001107"/>
+            </a:xfrm>
+            <a:prstGeom prst="straightConnector1">
+              <a:avLst/>
+            </a:prstGeom>
+            <a:ln w="127000">
+              <a:solidFill>
+                <a:srgbClr val="FFC000"/>
+              </a:solidFill>
+              <a:tailEnd type="triangle"/>
+            </a:ln>
+            <a:effectLst/>
+          </p:spPr>
+          <p:style>
+            <a:lnRef idx="2">
+              <a:schemeClr val="accent1"/>
+            </a:lnRef>
+            <a:fillRef idx="0">
+              <a:schemeClr val="accent1"/>
+            </a:fillRef>
+            <a:effectRef idx="1">
+              <a:schemeClr val="accent1"/>
+            </a:effectRef>
+            <a:fontRef idx="minor">
+              <a:schemeClr val="tx1"/>
+            </a:fontRef>
+          </p:style>
+        </p:cxnSp>
+        <p:sp>
+          <p:nvSpPr>
+            <p:cNvPr id="7" name="TextBox 6">
+              <a:extLst>
+                <a:ext uri="{FF2B5EF4-FFF2-40B4-BE49-F238E27FC236}">
+                  <a16:creationId xmlns:a16="http://schemas.microsoft.com/office/drawing/2014/main" id="{62C3B0C4-43DE-3449-9786-450F386D314F}"/>
+                </a:ext>
+              </a:extLst>
+            </p:cNvPr>
+            <p:cNvSpPr txBox="1"/>
+            <p:nvPr/>
+          </p:nvSpPr>
+          <p:spPr>
+            <a:xfrm rot="16200000">
+              <a:off x="-1616253" y="3373286"/>
+              <a:ext cx="3589894" cy="369332"/>
+            </a:xfrm>
+            <a:prstGeom prst="rect">
+              <a:avLst/>
+            </a:prstGeom>
+            <a:noFill/>
+          </p:spPr>
+          <p:txBody>
+            <a:bodyPr wrap="none" rtlCol="0">
+              <a:spAutoFit/>
+            </a:bodyPr>
+            <a:lstStyle/>
+            <a:p>
+              <a:r>
+                <a:rPr lang="en-US" dirty="0"/>
+                <a:t>Read the stack trace in this direction</a:t>
+              </a:r>
+            </a:p>
+          </p:txBody>
+        </p:sp>
+        <p:sp>
+          <p:nvSpPr>
+            <p:cNvPr id="35" name="Rectangle 34">
+              <a:extLst>
+                <a:ext uri="{FF2B5EF4-FFF2-40B4-BE49-F238E27FC236}">
+                  <a16:creationId xmlns:a16="http://schemas.microsoft.com/office/drawing/2014/main" id="{6483FE62-D610-EE43-B4C0-2D42FD828F2D}"/>
+                </a:ext>
+              </a:extLst>
+            </p:cNvPr>
+            <p:cNvSpPr/>
+            <p:nvPr/>
+          </p:nvSpPr>
+          <p:spPr>
+            <a:xfrm>
+              <a:off x="656492" y="3484240"/>
+              <a:ext cx="6037385" cy="1193268"/>
+            </a:xfrm>
+            <a:prstGeom prst="rect">
+              <a:avLst/>
+            </a:prstGeom>
+            <a:noFill/>
+            <a:ln w="63500">
+              <a:solidFill>
+                <a:srgbClr val="7030A0"/>
+              </a:solidFill>
+            </a:ln>
+            <a:effectLst/>
+          </p:spPr>
+          <p:style>
+            <a:lnRef idx="1">
+              <a:schemeClr val="accent1"/>
+            </a:lnRef>
+            <a:fillRef idx="3">
+              <a:schemeClr val="accent1"/>
+            </a:fillRef>
+            <a:effectRef idx="2">
+              <a:schemeClr val="accent1"/>
+            </a:effectRef>
+            <a:fontRef idx="minor">
+              <a:schemeClr val="lt1"/>
+            </a:fontRef>
+          </p:style>
+          <p:txBody>
+            <a:bodyPr rtlCol="0" anchor="ctr"/>
+            <a:lstStyle/>
+            <a:p>
+              <a:pPr algn="ctr"/>
+              <a:endParaRPr lang="en-US">
+                <a:solidFill>
+                  <a:srgbClr val="FF40FF"/>
+                </a:solidFill>
+              </a:endParaRPr>
+            </a:p>
+          </p:txBody>
+        </p:sp>
+        <p:sp>
+          <p:nvSpPr>
+            <p:cNvPr id="37" name="Rectangle 36">
+              <a:extLst>
+                <a:ext uri="{FF2B5EF4-FFF2-40B4-BE49-F238E27FC236}">
+                  <a16:creationId xmlns:a16="http://schemas.microsoft.com/office/drawing/2014/main" id="{416FB116-C4F1-C946-8817-4E8B08FE5BE3}"/>
+                </a:ext>
+              </a:extLst>
+            </p:cNvPr>
+            <p:cNvSpPr/>
+            <p:nvPr/>
+          </p:nvSpPr>
+          <p:spPr>
+            <a:xfrm>
+              <a:off x="656491" y="2350114"/>
+              <a:ext cx="5087817" cy="1018663"/>
+            </a:xfrm>
+            <a:prstGeom prst="rect">
+              <a:avLst/>
+            </a:prstGeom>
+            <a:noFill/>
+            <a:ln w="63500">
+              <a:solidFill>
+                <a:srgbClr val="7030A0"/>
+              </a:solidFill>
+            </a:ln>
+            <a:effectLst/>
+          </p:spPr>
+          <p:style>
+            <a:lnRef idx="1">
+              <a:schemeClr val="accent1"/>
+            </a:lnRef>
+            <a:fillRef idx="3">
+              <a:schemeClr val="accent1"/>
+            </a:fillRef>
+            <a:effectRef idx="2">
+              <a:schemeClr val="accent1"/>
+            </a:effectRef>
+            <a:fontRef idx="minor">
+              <a:schemeClr val="lt1"/>
+            </a:fontRef>
+          </p:style>
+          <p:txBody>
+            <a:bodyPr rtlCol="0" anchor="ctr"/>
+            <a:lstStyle/>
+            <a:p>
+              <a:pPr algn="ctr"/>
+              <a:endParaRPr lang="en-US">
+                <a:solidFill>
+                  <a:srgbClr val="FF40FF"/>
+                </a:solidFill>
+              </a:endParaRPr>
+            </a:p>
+          </p:txBody>
+        </p:sp>
+        <p:sp>
+          <p:nvSpPr>
+            <p:cNvPr id="8" name="TextBox 7">
+              <a:extLst>
+                <a:ext uri="{FF2B5EF4-FFF2-40B4-BE49-F238E27FC236}">
+                  <a16:creationId xmlns:a16="http://schemas.microsoft.com/office/drawing/2014/main" id="{C28CF808-F6F6-9340-B4E8-1D96AD82A581}"/>
+                </a:ext>
+              </a:extLst>
+            </p:cNvPr>
+            <p:cNvSpPr txBox="1"/>
+            <p:nvPr/>
+          </p:nvSpPr>
+          <p:spPr>
+            <a:xfrm>
+              <a:off x="5713590" y="2691377"/>
+              <a:ext cx="3610348" cy="1323439"/>
+            </a:xfrm>
+            <a:prstGeom prst="rect">
+              <a:avLst/>
+            </a:prstGeom>
+            <a:noFill/>
+          </p:spPr>
+          <p:txBody>
+            <a:bodyPr wrap="none" rtlCol="0">
+              <a:spAutoFit/>
+            </a:bodyPr>
+            <a:lstStyle/>
+            <a:p>
+              <a:pPr algn="r"/>
+              <a:r>
+                <a:rPr lang="en-US" sz="2000" b="1" dirty="0"/>
+                <a:t>This function (i.e. the notebook)</a:t>
+              </a:r>
+            </a:p>
+            <a:p>
+              <a:pPr algn="r"/>
+              <a:r>
+                <a:rPr lang="en-US" sz="2000" b="1" dirty="0"/>
+                <a:t>called</a:t>
+              </a:r>
+            </a:p>
+            <a:p>
+              <a:pPr algn="r"/>
+              <a:r>
+                <a:rPr lang="en-US" sz="2000" b="1" dirty="0"/>
+                <a:t>this function</a:t>
+              </a:r>
+            </a:p>
+            <a:p>
+              <a:pPr algn="r"/>
+              <a:r>
+                <a:rPr lang="en-US" sz="2000" b="1" dirty="0"/>
+                <a:t>(our </a:t>
+              </a:r>
+              <a:r>
+                <a:rPr lang="en-US" sz="2000" dirty="0">
+                  <a:latin typeface="Courier" pitchFamily="2" charset="0"/>
+                </a:rPr>
+                <a:t>hello</a:t>
+              </a:r>
+              <a:r>
+                <a:rPr lang="en-US" sz="2000" b="1" dirty="0"/>
+                <a:t> function)</a:t>
+              </a:r>
+            </a:p>
+          </p:txBody>
+        </p:sp>
+      </p:grpSp>
+    </p:spTree>
+    <p:extLst>
+      <p:ext uri="{BB962C8B-B14F-4D97-AF65-F5344CB8AC3E}">
+        <p14:creationId xmlns:p14="http://schemas.microsoft.com/office/powerpoint/2010/main" val="1346243911"/>
+      </p:ext>
+    </p:extLst>
+  </p:cSld>
+  <p:clrMapOvr>
+    <a:masterClrMapping/>
+  </p:clrMapOvr>
+</p:sld>
+</file>
+
+<file path=ppt/slides/slide5.xml><?xml version="1.0" encoding="utf-8"?>
 <p:sld xmlns:a="http://schemas.openxmlformats.org/drawingml/2006/main" xmlns:r="http://schemas.openxmlformats.org/officeDocument/2006/relationships" xmlns:p="http://schemas.openxmlformats.org/presentationml/2006/main">
   <p:cSld>
     <p:spTree>

</xml_diff>